<commit_message>
Updated PPT and Ipynb files. Added Data analysis and cleaning code part
</commit_message>
<xml_diff>
--- a/Lending Club Case Study.pptx
+++ b/Lending Club Case Study.pptx
@@ -10,17 +10,19 @@
     <p:sldId id="302" r:id="rId7"/>
     <p:sldId id="303" r:id="rId8"/>
     <p:sldId id="304" r:id="rId9"/>
-    <p:sldId id="305" r:id="rId10"/>
-    <p:sldId id="306" r:id="rId11"/>
-    <p:sldId id="307" r:id="rId12"/>
-    <p:sldId id="308" r:id="rId13"/>
-    <p:sldId id="309" r:id="rId14"/>
-    <p:sldId id="310" r:id="rId15"/>
-    <p:sldId id="311" r:id="rId16"/>
-    <p:sldId id="312" r:id="rId17"/>
-    <p:sldId id="313" r:id="rId18"/>
-    <p:sldId id="314" r:id="rId19"/>
-    <p:sldId id="316" r:id="rId20"/>
+    <p:sldId id="318" r:id="rId10"/>
+    <p:sldId id="317" r:id="rId11"/>
+    <p:sldId id="305" r:id="rId12"/>
+    <p:sldId id="306" r:id="rId13"/>
+    <p:sldId id="307" r:id="rId14"/>
+    <p:sldId id="308" r:id="rId15"/>
+    <p:sldId id="309" r:id="rId16"/>
+    <p:sldId id="310" r:id="rId17"/>
+    <p:sldId id="311" r:id="rId18"/>
+    <p:sldId id="312" r:id="rId19"/>
+    <p:sldId id="313" r:id="rId20"/>
+    <p:sldId id="314" r:id="rId21"/>
+    <p:sldId id="316" r:id="rId22"/>
   </p:sldIdLst>
   <p:sldSz cx="12192000" cy="6858000"/>
   <p:notesSz cx="6858000" cy="9144000"/>
@@ -10358,7 +10360,7 @@
           <a:p>
             <a:fld id="{9184DA70-C731-4C70-880D-CCD4705E623C}" type="datetime1">
               <a:rPr lang="en-US" smtClean="0"/>
-              <a:t>6/26/2023</a:t>
+              <a:t>6/27/2023</a:t>
             </a:fld>
             <a:endParaRPr lang="en-US" dirty="0"/>
           </a:p>
@@ -10546,7 +10548,7 @@
           <a:p>
             <a:fld id="{4BE1D723-8F53-4F53-90B0-1982A396982E}" type="datetime1">
               <a:rPr lang="en-US" smtClean="0"/>
-              <a:t>6/26/2023</a:t>
+              <a:t>6/27/2023</a:t>
             </a:fld>
             <a:endParaRPr lang="en-US" dirty="0"/>
           </a:p>
@@ -10919,7 +10921,7 @@
           <a:p>
             <a:fld id="{97669AF7-7BEB-44E4-9852-375E34362B5B}" type="datetime1">
               <a:rPr lang="en-US" smtClean="0"/>
-              <a:t>6/26/2023</a:t>
+              <a:t>6/27/2023</a:t>
             </a:fld>
             <a:endParaRPr lang="en-US" dirty="0"/>
           </a:p>
@@ -11174,7 +11176,7 @@
           <a:p>
             <a:fld id="{BAAAC38D-0552-4C82-B593-E6124DFADBE2}" type="datetime1">
               <a:rPr lang="en-US" smtClean="0"/>
-              <a:t>6/26/2023</a:t>
+              <a:t>6/27/2023</a:t>
             </a:fld>
             <a:endParaRPr lang="en-US" dirty="0"/>
           </a:p>
@@ -11571,7 +11573,7 @@
           <a:p>
             <a:fld id="{D9DF0F1C-5577-4ACB-BB62-DF8F3C494C7E}" type="datetime1">
               <a:rPr lang="en-US" smtClean="0"/>
-              <a:t>6/26/2023</a:t>
+              <a:t>6/27/2023</a:t>
             </a:fld>
             <a:endParaRPr lang="en-US" dirty="0"/>
           </a:p>
@@ -11707,7 +11709,7 @@
           <a:p>
             <a:fld id="{1775B394-D9F9-4F0C-B15D-605F45CB9E9F}" type="datetime1">
               <a:rPr lang="en-US" smtClean="0"/>
-              <a:t>6/26/2023</a:t>
+              <a:t>6/27/2023</a:t>
             </a:fld>
             <a:endParaRPr lang="en-US" dirty="0"/>
           </a:p>
@@ -11864,7 +11866,7 @@
           <a:p>
             <a:fld id="{39667345-2558-425A-8533-9BFDBCE15005}" type="datetime1">
               <a:rPr lang="en-US" smtClean="0"/>
-              <a:t>6/26/2023</a:t>
+              <a:t>6/27/2023</a:t>
             </a:fld>
             <a:endParaRPr lang="en-US" dirty="0"/>
           </a:p>
@@ -12193,7 +12195,7 @@
           <a:p>
             <a:fld id="{92BEA474-078D-4E9B-9B14-09A87B19DC46}" type="datetime1">
               <a:rPr lang="en-US" smtClean="0"/>
-              <a:t>6/26/2023</a:t>
+              <a:t>6/27/2023</a:t>
             </a:fld>
             <a:endParaRPr lang="en-US" dirty="0"/>
           </a:p>
@@ -12543,7 +12545,7 @@
           <a:p>
             <a:fld id="{4907D986-8816-4272-A432-0437A28A9828}" type="datetime1">
               <a:rPr lang="en-US" smtClean="0"/>
-              <a:t>6/26/2023</a:t>
+              <a:t>6/27/2023</a:t>
             </a:fld>
             <a:endParaRPr lang="en-US" dirty="0"/>
           </a:p>
@@ -12804,7 +12806,7 @@
           <a:p>
             <a:fld id="{62D6E202-B606-4609-B914-27C9371A1F6D}" type="datetime1">
               <a:rPr lang="en-US" smtClean="0"/>
-              <a:t>6/26/2023</a:t>
+              <a:t>6/27/2023</a:t>
             </a:fld>
             <a:endParaRPr lang="en-US" dirty="0"/>
           </a:p>
@@ -13714,7 +13716,7 @@
           <a:p>
             <a:r>
               <a:rPr lang="en-IN" sz="4000" dirty="0"/>
-              <a:t>Bivariate/Multivariate Analysis</a:t>
+              <a:t>Univariate/Segmented Analysis</a:t>
             </a:r>
           </a:p>
         </p:txBody>
@@ -13807,7 +13809,7 @@
     </p:spTree>
     <p:extLst>
       <p:ext uri="{BB962C8B-B14F-4D97-AF65-F5344CB8AC3E}">
-        <p14:creationId xmlns:p14="http://schemas.microsoft.com/office/powerpoint/2010/main" val="1794384894"/>
+        <p14:creationId xmlns:p14="http://schemas.microsoft.com/office/powerpoint/2010/main" val="2974645228"/>
       </p:ext>
     </p:extLst>
   </p:cSld>
@@ -13952,7 +13954,7 @@
     </p:spTree>
     <p:extLst>
       <p:ext uri="{BB962C8B-B14F-4D97-AF65-F5344CB8AC3E}">
-        <p14:creationId xmlns:p14="http://schemas.microsoft.com/office/powerpoint/2010/main" val="126949672"/>
+        <p14:creationId xmlns:p14="http://schemas.microsoft.com/office/powerpoint/2010/main" val="1480929448"/>
       </p:ext>
     </p:extLst>
   </p:cSld>
@@ -14097,6 +14099,296 @@
     </p:spTree>
     <p:extLst>
       <p:ext uri="{BB962C8B-B14F-4D97-AF65-F5344CB8AC3E}">
+        <p14:creationId xmlns:p14="http://schemas.microsoft.com/office/powerpoint/2010/main" val="1794384894"/>
+      </p:ext>
+    </p:extLst>
+  </p:cSld>
+  <p:clrMapOvr>
+    <a:masterClrMapping/>
+  </p:clrMapOvr>
+</p:sld>
+</file>
+
+<file path=ppt/slides/slide13.xml><?xml version="1.0" encoding="utf-8"?>
+<p:sld xmlns:a="http://schemas.openxmlformats.org/drawingml/2006/main" xmlns:r="http://schemas.openxmlformats.org/officeDocument/2006/relationships" xmlns:p="http://schemas.openxmlformats.org/presentationml/2006/main">
+  <p:cSld>
+    <p:spTree>
+      <p:nvGrpSpPr>
+        <p:cNvPr id="1" name=""/>
+        <p:cNvGrpSpPr/>
+        <p:nvPr/>
+      </p:nvGrpSpPr>
+      <p:grpSpPr>
+        <a:xfrm>
+          <a:off x="0" y="0"/>
+          <a:ext cx="0" cy="0"/>
+          <a:chOff x="0" y="0"/>
+          <a:chExt cx="0" cy="0"/>
+        </a:xfrm>
+      </p:grpSpPr>
+      <p:sp>
+        <p:nvSpPr>
+          <p:cNvPr id="2" name="Title 1">
+            <a:extLst>
+              <a:ext uri="{FF2B5EF4-FFF2-40B4-BE49-F238E27FC236}">
+                <a16:creationId xmlns:a16="http://schemas.microsoft.com/office/drawing/2014/main" id="{F4AD4361-B14F-C4E6-2C78-947E5FA499C5}"/>
+              </a:ext>
+            </a:extLst>
+          </p:cNvPr>
+          <p:cNvSpPr>
+            <a:spLocks noGrp="1"/>
+          </p:cNvSpPr>
+          <p:nvPr>
+            <p:ph type="title"/>
+          </p:nvPr>
+        </p:nvSpPr>
+        <p:spPr/>
+        <p:txBody>
+          <a:bodyPr>
+            <a:normAutofit/>
+          </a:bodyPr>
+          <a:lstStyle/>
+          <a:p>
+            <a:r>
+              <a:rPr lang="en-IN" sz="4000" dirty="0"/>
+              <a:t>Bivariate/Multivariate Analysis</a:t>
+            </a:r>
+          </a:p>
+        </p:txBody>
+      </p:sp>
+      <p:sp>
+        <p:nvSpPr>
+          <p:cNvPr id="3" name="Content Placeholder 2">
+            <a:extLst>
+              <a:ext uri="{FF2B5EF4-FFF2-40B4-BE49-F238E27FC236}">
+                <a16:creationId xmlns:a16="http://schemas.microsoft.com/office/drawing/2014/main" id="{223BCCFF-517C-F2CD-8998-4258D7310EC5}"/>
+              </a:ext>
+            </a:extLst>
+          </p:cNvPr>
+          <p:cNvSpPr>
+            <a:spLocks noGrp="1"/>
+          </p:cNvSpPr>
+          <p:nvPr>
+            <p:ph idx="1"/>
+          </p:nvPr>
+        </p:nvSpPr>
+        <p:spPr/>
+        <p:txBody>
+          <a:bodyPr/>
+          <a:lstStyle/>
+          <a:p>
+            <a:endParaRPr lang="en-IN" dirty="0"/>
+          </a:p>
+        </p:txBody>
+      </p:sp>
+      <p:pic>
+        <p:nvPicPr>
+          <p:cNvPr id="4" name="Picture 3">
+            <a:extLst>
+              <a:ext uri="{FF2B5EF4-FFF2-40B4-BE49-F238E27FC236}">
+                <a16:creationId xmlns:a16="http://schemas.microsoft.com/office/drawing/2014/main" id="{3EF0EC5E-FBF5-7E6C-FDC6-594F83CFF276}"/>
+              </a:ext>
+            </a:extLst>
+          </p:cNvPr>
+          <p:cNvPicPr>
+            <a:picLocks noChangeAspect="1"/>
+          </p:cNvPicPr>
+          <p:nvPr/>
+        </p:nvPicPr>
+        <p:blipFill>
+          <a:blip r:embed="rId2"/>
+          <a:stretch>
+            <a:fillRect/>
+          </a:stretch>
+        </p:blipFill>
+        <p:spPr>
+          <a:xfrm>
+            <a:off x="-65885" y="-64169"/>
+            <a:ext cx="2857500" cy="762000"/>
+          </a:xfrm>
+          <a:prstGeom prst="rect">
+            <a:avLst/>
+          </a:prstGeom>
+        </p:spPr>
+      </p:pic>
+      <p:pic>
+        <p:nvPicPr>
+          <p:cNvPr id="5" name="Picture 4">
+            <a:extLst>
+              <a:ext uri="{FF2B5EF4-FFF2-40B4-BE49-F238E27FC236}">
+                <a16:creationId xmlns:a16="http://schemas.microsoft.com/office/drawing/2014/main" id="{20FA44F5-0486-A9E2-0F61-FE2D0A023490}"/>
+              </a:ext>
+            </a:extLst>
+          </p:cNvPr>
+          <p:cNvPicPr>
+            <a:picLocks noChangeAspect="1"/>
+          </p:cNvPicPr>
+          <p:nvPr/>
+        </p:nvPicPr>
+        <p:blipFill>
+          <a:blip r:embed="rId3"/>
+          <a:stretch>
+            <a:fillRect/>
+          </a:stretch>
+        </p:blipFill>
+        <p:spPr>
+          <a:xfrm>
+            <a:off x="10274967" y="18187"/>
+            <a:ext cx="1917032" cy="581804"/>
+          </a:xfrm>
+          <a:prstGeom prst="rect">
+            <a:avLst/>
+          </a:prstGeom>
+        </p:spPr>
+      </p:pic>
+    </p:spTree>
+    <p:extLst>
+      <p:ext uri="{BB962C8B-B14F-4D97-AF65-F5344CB8AC3E}">
+        <p14:creationId xmlns:p14="http://schemas.microsoft.com/office/powerpoint/2010/main" val="126949672"/>
+      </p:ext>
+    </p:extLst>
+  </p:cSld>
+  <p:clrMapOvr>
+    <a:masterClrMapping/>
+  </p:clrMapOvr>
+</p:sld>
+</file>
+
+<file path=ppt/slides/slide14.xml><?xml version="1.0" encoding="utf-8"?>
+<p:sld xmlns:a="http://schemas.openxmlformats.org/drawingml/2006/main" xmlns:r="http://schemas.openxmlformats.org/officeDocument/2006/relationships" xmlns:p="http://schemas.openxmlformats.org/presentationml/2006/main">
+  <p:cSld>
+    <p:spTree>
+      <p:nvGrpSpPr>
+        <p:cNvPr id="1" name=""/>
+        <p:cNvGrpSpPr/>
+        <p:nvPr/>
+      </p:nvGrpSpPr>
+      <p:grpSpPr>
+        <a:xfrm>
+          <a:off x="0" y="0"/>
+          <a:ext cx="0" cy="0"/>
+          <a:chOff x="0" y="0"/>
+          <a:chExt cx="0" cy="0"/>
+        </a:xfrm>
+      </p:grpSpPr>
+      <p:sp>
+        <p:nvSpPr>
+          <p:cNvPr id="2" name="Title 1">
+            <a:extLst>
+              <a:ext uri="{FF2B5EF4-FFF2-40B4-BE49-F238E27FC236}">
+                <a16:creationId xmlns:a16="http://schemas.microsoft.com/office/drawing/2014/main" id="{F4AD4361-B14F-C4E6-2C78-947E5FA499C5}"/>
+              </a:ext>
+            </a:extLst>
+          </p:cNvPr>
+          <p:cNvSpPr>
+            <a:spLocks noGrp="1"/>
+          </p:cNvSpPr>
+          <p:nvPr>
+            <p:ph type="title"/>
+          </p:nvPr>
+        </p:nvSpPr>
+        <p:spPr/>
+        <p:txBody>
+          <a:bodyPr>
+            <a:normAutofit/>
+          </a:bodyPr>
+          <a:lstStyle/>
+          <a:p>
+            <a:r>
+              <a:rPr lang="en-IN" sz="4000" dirty="0"/>
+              <a:t>Bivariate/Multivariate Analysis</a:t>
+            </a:r>
+          </a:p>
+        </p:txBody>
+      </p:sp>
+      <p:sp>
+        <p:nvSpPr>
+          <p:cNvPr id="3" name="Content Placeholder 2">
+            <a:extLst>
+              <a:ext uri="{FF2B5EF4-FFF2-40B4-BE49-F238E27FC236}">
+                <a16:creationId xmlns:a16="http://schemas.microsoft.com/office/drawing/2014/main" id="{223BCCFF-517C-F2CD-8998-4258D7310EC5}"/>
+              </a:ext>
+            </a:extLst>
+          </p:cNvPr>
+          <p:cNvSpPr>
+            <a:spLocks noGrp="1"/>
+          </p:cNvSpPr>
+          <p:nvPr>
+            <p:ph idx="1"/>
+          </p:nvPr>
+        </p:nvSpPr>
+        <p:spPr/>
+        <p:txBody>
+          <a:bodyPr/>
+          <a:lstStyle/>
+          <a:p>
+            <a:endParaRPr lang="en-IN" dirty="0"/>
+          </a:p>
+        </p:txBody>
+      </p:sp>
+      <p:pic>
+        <p:nvPicPr>
+          <p:cNvPr id="4" name="Picture 3">
+            <a:extLst>
+              <a:ext uri="{FF2B5EF4-FFF2-40B4-BE49-F238E27FC236}">
+                <a16:creationId xmlns:a16="http://schemas.microsoft.com/office/drawing/2014/main" id="{3EF0EC5E-FBF5-7E6C-FDC6-594F83CFF276}"/>
+              </a:ext>
+            </a:extLst>
+          </p:cNvPr>
+          <p:cNvPicPr>
+            <a:picLocks noChangeAspect="1"/>
+          </p:cNvPicPr>
+          <p:nvPr/>
+        </p:nvPicPr>
+        <p:blipFill>
+          <a:blip r:embed="rId2"/>
+          <a:stretch>
+            <a:fillRect/>
+          </a:stretch>
+        </p:blipFill>
+        <p:spPr>
+          <a:xfrm>
+            <a:off x="-65885" y="-64169"/>
+            <a:ext cx="2857500" cy="762000"/>
+          </a:xfrm>
+          <a:prstGeom prst="rect">
+            <a:avLst/>
+          </a:prstGeom>
+        </p:spPr>
+      </p:pic>
+      <p:pic>
+        <p:nvPicPr>
+          <p:cNvPr id="5" name="Picture 4">
+            <a:extLst>
+              <a:ext uri="{FF2B5EF4-FFF2-40B4-BE49-F238E27FC236}">
+                <a16:creationId xmlns:a16="http://schemas.microsoft.com/office/drawing/2014/main" id="{20FA44F5-0486-A9E2-0F61-FE2D0A023490}"/>
+              </a:ext>
+            </a:extLst>
+          </p:cNvPr>
+          <p:cNvPicPr>
+            <a:picLocks noChangeAspect="1"/>
+          </p:cNvPicPr>
+          <p:nvPr/>
+        </p:nvPicPr>
+        <p:blipFill>
+          <a:blip r:embed="rId3"/>
+          <a:stretch>
+            <a:fillRect/>
+          </a:stretch>
+        </p:blipFill>
+        <p:spPr>
+          <a:xfrm>
+            <a:off x="10274967" y="18187"/>
+            <a:ext cx="1917032" cy="581804"/>
+          </a:xfrm>
+          <a:prstGeom prst="rect">
+            <a:avLst/>
+          </a:prstGeom>
+        </p:spPr>
+      </p:pic>
+    </p:spTree>
+    <p:extLst>
+      <p:ext uri="{BB962C8B-B14F-4D97-AF65-F5344CB8AC3E}">
         <p14:creationId xmlns:p14="http://schemas.microsoft.com/office/powerpoint/2010/main" val="2811767844"/>
       </p:ext>
     </p:extLst>
@@ -14107,7 +14399,7 @@
 </p:sld>
 </file>
 
-<file path=ppt/slides/slide13.xml><?xml version="1.0" encoding="utf-8"?>
+<file path=ppt/slides/slide15.xml><?xml version="1.0" encoding="utf-8"?>
 <p:sld xmlns:a="http://schemas.openxmlformats.org/drawingml/2006/main" xmlns:r="http://schemas.openxmlformats.org/officeDocument/2006/relationships" xmlns:p="http://schemas.openxmlformats.org/presentationml/2006/main">
   <p:cSld>
     <p:spTree>
@@ -14252,7 +14544,7 @@
 </p:sld>
 </file>
 
-<file path=ppt/slides/slide14.xml><?xml version="1.0" encoding="utf-8"?>
+<file path=ppt/slides/slide16.xml><?xml version="1.0" encoding="utf-8"?>
 <p:sld xmlns:a="http://schemas.openxmlformats.org/drawingml/2006/main" xmlns:r="http://schemas.openxmlformats.org/officeDocument/2006/relationships" xmlns:p="http://schemas.openxmlformats.org/presentationml/2006/main">
   <p:cSld>
     <p:spTree>
@@ -14397,7 +14689,7 @@
 </p:sld>
 </file>
 
-<file path=ppt/slides/slide15.xml><?xml version="1.0" encoding="utf-8"?>
+<file path=ppt/slides/slide17.xml><?xml version="1.0" encoding="utf-8"?>
 <p:sld xmlns:a="http://schemas.openxmlformats.org/drawingml/2006/main" xmlns:r="http://schemas.openxmlformats.org/officeDocument/2006/relationships" xmlns:p="http://schemas.openxmlformats.org/presentationml/2006/main">
   <p:cSld>
     <p:spTree>
@@ -14681,7 +14973,7 @@
 </p:sld>
 </file>
 
-<file path=ppt/slides/slide16.xml><?xml version="1.0" encoding="utf-8"?>
+<file path=ppt/slides/slide18.xml><?xml version="1.0" encoding="utf-8"?>
 <p:sld xmlns:a="http://schemas.openxmlformats.org/drawingml/2006/main" xmlns:r="http://schemas.openxmlformats.org/officeDocument/2006/relationships" xmlns:p="http://schemas.openxmlformats.org/presentationml/2006/main">
   <p:cSld>
     <p:spTree>
@@ -15533,6 +15825,609 @@
           <a:p>
             <a:r>
               <a:rPr lang="en-IN" sz="4000" dirty="0"/>
+              <a:t>Data Cleaning Techniques</a:t>
+            </a:r>
+          </a:p>
+        </p:txBody>
+      </p:sp>
+      <p:sp>
+        <p:nvSpPr>
+          <p:cNvPr id="3" name="Content Placeholder 2">
+            <a:extLst>
+              <a:ext uri="{FF2B5EF4-FFF2-40B4-BE49-F238E27FC236}">
+                <a16:creationId xmlns:a16="http://schemas.microsoft.com/office/drawing/2014/main" id="{223BCCFF-517C-F2CD-8998-4258D7310EC5}"/>
+              </a:ext>
+            </a:extLst>
+          </p:cNvPr>
+          <p:cNvSpPr>
+            <a:spLocks noGrp="1"/>
+          </p:cNvSpPr>
+          <p:nvPr>
+            <p:ph idx="1"/>
+          </p:nvPr>
+        </p:nvSpPr>
+        <p:spPr/>
+        <p:txBody>
+          <a:bodyPr>
+            <a:normAutofit/>
+          </a:bodyPr>
+          <a:lstStyle/>
+          <a:p>
+            <a:pPr lvl="1"/>
+            <a:r>
+              <a:rPr lang="en-US" sz="1200" dirty="0"/>
+              <a:t>In Python, missing data is represented using either of the two objects </a:t>
+            </a:r>
+            <a:r>
+              <a:rPr lang="en-US" sz="1200" dirty="0" err="1"/>
+              <a:t>NaN</a:t>
+            </a:r>
+            <a:r>
+              <a:rPr lang="en-US" sz="1200" dirty="0"/>
+              <a:t> (Not a Number) or NULL. We'll not get into the differences between them and how Python stores them internally etc. We'll focus on studying ways to identify and treat missing values in Pandas </a:t>
+            </a:r>
+            <a:r>
+              <a:rPr lang="en-US" sz="1200" dirty="0" err="1"/>
+              <a:t>dataframes</a:t>
+            </a:r>
+            <a:r>
+              <a:rPr lang="en-US" sz="1200" dirty="0"/>
+              <a:t>.</a:t>
+            </a:r>
+          </a:p>
+          <a:p>
+            <a:pPr marL="201168" lvl="1" indent="0">
+              <a:buNone/>
+            </a:pPr>
+            <a:endParaRPr lang="en-US" sz="1200" dirty="0"/>
+          </a:p>
+          <a:p>
+            <a:pPr marL="201168" lvl="1" indent="0">
+              <a:buNone/>
+            </a:pPr>
+            <a:r>
+              <a:rPr lang="en-US" sz="1200" u="sng" dirty="0"/>
+              <a:t>STEPS :</a:t>
+            </a:r>
+          </a:p>
+          <a:p>
+            <a:pPr marL="201168" lvl="1" indent="0">
+              <a:buNone/>
+            </a:pPr>
+            <a:r>
+              <a:rPr lang="en-US" sz="1200" dirty="0"/>
+              <a:t>• Delete columns: Delete unnecessary columns. </a:t>
+            </a:r>
+          </a:p>
+          <a:p>
+            <a:pPr marL="201168" lvl="1" indent="0">
+              <a:buNone/>
+            </a:pPr>
+            <a:r>
+              <a:rPr lang="en-US" sz="1200" dirty="0"/>
+              <a:t>• Remove outliers: Remove high and low values that would disproportionately affect the results of your analysis.</a:t>
+            </a:r>
+          </a:p>
+          <a:p>
+            <a:pPr marL="201168" lvl="1" indent="0">
+              <a:buNone/>
+            </a:pPr>
+            <a:r>
+              <a:rPr lang="en-US" sz="1200" dirty="0"/>
+              <a:t>• Missing values: Treat missing values with appropriate approach. </a:t>
+            </a:r>
+          </a:p>
+          <a:p>
+            <a:pPr marL="201168" lvl="1" indent="0">
+              <a:buNone/>
+            </a:pPr>
+            <a:r>
+              <a:rPr lang="en-US" sz="1200" dirty="0"/>
+              <a:t>• Duplicate data: Remove identical rows, remove rows where some columns are identical. </a:t>
+            </a:r>
+          </a:p>
+          <a:p>
+            <a:pPr marL="201168" lvl="1" indent="0">
+              <a:buNone/>
+            </a:pPr>
+            <a:r>
+              <a:rPr lang="en-US" sz="1200" dirty="0"/>
+              <a:t>• Filter rows: Filter by segment, filter by date period to get only the rows relevant to the analysis. </a:t>
+            </a:r>
+          </a:p>
+          <a:p>
+            <a:pPr marL="692658" lvl="1" indent="-400050">
+              <a:buFont typeface="+mj-lt"/>
+              <a:buAutoNum type="romanUcPeriod"/>
+            </a:pPr>
+            <a:endParaRPr lang="en-IN" sz="1200" dirty="0"/>
+          </a:p>
+          <a:p>
+            <a:pPr marL="292608" lvl="1" indent="0">
+              <a:buNone/>
+            </a:pPr>
+            <a:endParaRPr lang="en-US" sz="1200" dirty="0"/>
+          </a:p>
+        </p:txBody>
+      </p:sp>
+      <p:pic>
+        <p:nvPicPr>
+          <p:cNvPr id="4" name="Picture 3">
+            <a:extLst>
+              <a:ext uri="{FF2B5EF4-FFF2-40B4-BE49-F238E27FC236}">
+                <a16:creationId xmlns:a16="http://schemas.microsoft.com/office/drawing/2014/main" id="{3EF0EC5E-FBF5-7E6C-FDC6-594F83CFF276}"/>
+              </a:ext>
+            </a:extLst>
+          </p:cNvPr>
+          <p:cNvPicPr>
+            <a:picLocks noChangeAspect="1"/>
+          </p:cNvPicPr>
+          <p:nvPr/>
+        </p:nvPicPr>
+        <p:blipFill>
+          <a:blip r:embed="rId2"/>
+          <a:stretch>
+            <a:fillRect/>
+          </a:stretch>
+        </p:blipFill>
+        <p:spPr>
+          <a:xfrm>
+            <a:off x="-65885" y="-64169"/>
+            <a:ext cx="2857500" cy="762000"/>
+          </a:xfrm>
+          <a:prstGeom prst="rect">
+            <a:avLst/>
+          </a:prstGeom>
+        </p:spPr>
+      </p:pic>
+      <p:pic>
+        <p:nvPicPr>
+          <p:cNvPr id="5" name="Picture 4">
+            <a:extLst>
+              <a:ext uri="{FF2B5EF4-FFF2-40B4-BE49-F238E27FC236}">
+                <a16:creationId xmlns:a16="http://schemas.microsoft.com/office/drawing/2014/main" id="{20FA44F5-0486-A9E2-0F61-FE2D0A023490}"/>
+              </a:ext>
+            </a:extLst>
+          </p:cNvPr>
+          <p:cNvPicPr>
+            <a:picLocks noChangeAspect="1"/>
+          </p:cNvPicPr>
+          <p:nvPr/>
+        </p:nvPicPr>
+        <p:blipFill>
+          <a:blip r:embed="rId3"/>
+          <a:stretch>
+            <a:fillRect/>
+          </a:stretch>
+        </p:blipFill>
+        <p:spPr>
+          <a:xfrm>
+            <a:off x="10274967" y="18187"/>
+            <a:ext cx="1917032" cy="581804"/>
+          </a:xfrm>
+          <a:prstGeom prst="rect">
+            <a:avLst/>
+          </a:prstGeom>
+        </p:spPr>
+      </p:pic>
+      <p:pic>
+        <p:nvPicPr>
+          <p:cNvPr id="1030" name="Picture 6" descr="Category: OSHA - STAC Card">
+            <a:extLst>
+              <a:ext uri="{FF2B5EF4-FFF2-40B4-BE49-F238E27FC236}">
+                <a16:creationId xmlns:a16="http://schemas.microsoft.com/office/drawing/2014/main" id="{173D2B57-6A06-85BF-467D-E095F69289F2}"/>
+              </a:ext>
+            </a:extLst>
+          </p:cNvPr>
+          <p:cNvPicPr>
+            <a:picLocks noChangeAspect="1" noChangeArrowheads="1"/>
+          </p:cNvPicPr>
+          <p:nvPr/>
+        </p:nvPicPr>
+        <p:blipFill>
+          <a:blip r:embed="rId4">
+            <a:extLst>
+              <a:ext uri="{28A0092B-C50C-407E-A947-70E740481C1C}">
+                <a14:useLocalDpi xmlns:a14="http://schemas.microsoft.com/office/drawing/2010/main" val="0"/>
+              </a:ext>
+            </a:extLst>
+          </a:blip>
+          <a:srcRect/>
+          <a:stretch>
+            <a:fillRect/>
+          </a:stretch>
+        </p:blipFill>
+        <p:spPr bwMode="auto">
+          <a:xfrm>
+            <a:off x="7524750" y="3324726"/>
+            <a:ext cx="4514850" cy="2695574"/>
+          </a:xfrm>
+          <a:prstGeom prst="rect">
+            <a:avLst/>
+          </a:prstGeom>
+          <a:noFill/>
+          <a:extLst>
+            <a:ext uri="{909E8E84-426E-40DD-AFC4-6F175D3DCCD1}">
+              <a14:hiddenFill xmlns:a14="http://schemas.microsoft.com/office/drawing/2010/main">
+                <a:solidFill>
+                  <a:srgbClr val="FFFFFF"/>
+                </a:solidFill>
+              </a14:hiddenFill>
+            </a:ext>
+          </a:extLst>
+        </p:spPr>
+      </p:pic>
+    </p:spTree>
+    <p:extLst>
+      <p:ext uri="{BB962C8B-B14F-4D97-AF65-F5344CB8AC3E}">
+        <p14:creationId xmlns:p14="http://schemas.microsoft.com/office/powerpoint/2010/main" val="505863472"/>
+      </p:ext>
+    </p:extLst>
+  </p:cSld>
+  <p:clrMapOvr>
+    <a:masterClrMapping/>
+  </p:clrMapOvr>
+</p:sld>
+</file>
+
+<file path=ppt/slides/slide6.xml><?xml version="1.0" encoding="utf-8"?>
+<p:sld xmlns:a="http://schemas.openxmlformats.org/drawingml/2006/main" xmlns:r="http://schemas.openxmlformats.org/officeDocument/2006/relationships" xmlns:p="http://schemas.openxmlformats.org/presentationml/2006/main">
+  <p:cSld>
+    <p:spTree>
+      <p:nvGrpSpPr>
+        <p:cNvPr id="1" name=""/>
+        <p:cNvGrpSpPr/>
+        <p:nvPr/>
+      </p:nvGrpSpPr>
+      <p:grpSpPr>
+        <a:xfrm>
+          <a:off x="0" y="0"/>
+          <a:ext cx="0" cy="0"/>
+          <a:chOff x="0" y="0"/>
+          <a:chExt cx="0" cy="0"/>
+        </a:xfrm>
+      </p:grpSpPr>
+      <p:sp>
+        <p:nvSpPr>
+          <p:cNvPr id="2" name="Title 1">
+            <a:extLst>
+              <a:ext uri="{FF2B5EF4-FFF2-40B4-BE49-F238E27FC236}">
+                <a16:creationId xmlns:a16="http://schemas.microsoft.com/office/drawing/2014/main" id="{F4AD4361-B14F-C4E6-2C78-947E5FA499C5}"/>
+              </a:ext>
+            </a:extLst>
+          </p:cNvPr>
+          <p:cNvSpPr>
+            <a:spLocks noGrp="1"/>
+          </p:cNvSpPr>
+          <p:nvPr>
+            <p:ph type="title"/>
+          </p:nvPr>
+        </p:nvSpPr>
+        <p:spPr/>
+        <p:txBody>
+          <a:bodyPr>
+            <a:normAutofit/>
+          </a:bodyPr>
+          <a:lstStyle/>
+          <a:p>
+            <a:r>
+              <a:rPr lang="en-IN" sz="4000" dirty="0"/>
+              <a:t>Data Cleaning Techniques</a:t>
+            </a:r>
+          </a:p>
+        </p:txBody>
+      </p:sp>
+      <p:sp>
+        <p:nvSpPr>
+          <p:cNvPr id="3" name="Content Placeholder 2">
+            <a:extLst>
+              <a:ext uri="{FF2B5EF4-FFF2-40B4-BE49-F238E27FC236}">
+                <a16:creationId xmlns:a16="http://schemas.microsoft.com/office/drawing/2014/main" id="{223BCCFF-517C-F2CD-8998-4258D7310EC5}"/>
+              </a:ext>
+            </a:extLst>
+          </p:cNvPr>
+          <p:cNvSpPr>
+            <a:spLocks noGrp="1"/>
+          </p:cNvSpPr>
+          <p:nvPr>
+            <p:ph idx="1"/>
+          </p:nvPr>
+        </p:nvSpPr>
+        <p:spPr/>
+        <p:txBody>
+          <a:bodyPr>
+            <a:normAutofit/>
+          </a:bodyPr>
+          <a:lstStyle/>
+          <a:p>
+            <a:pPr marL="201168" lvl="1" indent="0">
+              <a:buNone/>
+            </a:pPr>
+            <a:endParaRPr lang="en-US" sz="1400" dirty="0"/>
+          </a:p>
+          <a:p>
+            <a:pPr lvl="1"/>
+            <a:r>
+              <a:rPr lang="en-US" sz="1400" dirty="0"/>
+              <a:t>There are four main methods to identify and treat missing data:</a:t>
+            </a:r>
+          </a:p>
+          <a:p>
+            <a:pPr marL="692658" lvl="1" indent="-400050">
+              <a:buFont typeface="+mj-lt"/>
+              <a:buAutoNum type="romanUcPeriod"/>
+            </a:pPr>
+            <a:r>
+              <a:rPr lang="en-US" sz="1400" dirty="0" err="1"/>
+              <a:t>isnull</a:t>
+            </a:r>
+            <a:r>
+              <a:rPr lang="en-US" sz="1400" dirty="0"/>
+              <a:t>(): Indicates presence of missing values, returns a </a:t>
+            </a:r>
+            <a:r>
+              <a:rPr lang="en-US" sz="1400" dirty="0" err="1"/>
+              <a:t>boolean</a:t>
+            </a:r>
+            <a:endParaRPr lang="en-US" sz="1400" dirty="0"/>
+          </a:p>
+          <a:p>
+            <a:pPr marL="692658" lvl="1" indent="-400050">
+              <a:buFont typeface="+mj-lt"/>
+              <a:buAutoNum type="romanUcPeriod"/>
+            </a:pPr>
+            <a:r>
+              <a:rPr lang="en-US" sz="1400" dirty="0" err="1"/>
+              <a:t>notnull</a:t>
+            </a:r>
+            <a:r>
+              <a:rPr lang="en-US" sz="1400" dirty="0"/>
+              <a:t>(): Opposite of </a:t>
+            </a:r>
+            <a:r>
+              <a:rPr lang="en-US" sz="1400" dirty="0" err="1"/>
+              <a:t>isnull</a:t>
+            </a:r>
+            <a:r>
+              <a:rPr lang="en-US" sz="1400" dirty="0"/>
+              <a:t>(), returns a </a:t>
+            </a:r>
+            <a:r>
+              <a:rPr lang="en-US" sz="1400" dirty="0" err="1"/>
+              <a:t>boolean</a:t>
+            </a:r>
+            <a:endParaRPr lang="en-US" sz="1400" dirty="0"/>
+          </a:p>
+          <a:p>
+            <a:pPr marL="692658" lvl="1" indent="-400050">
+              <a:buFont typeface="+mj-lt"/>
+              <a:buAutoNum type="romanUcPeriod"/>
+            </a:pPr>
+            <a:r>
+              <a:rPr lang="en-US" sz="1400" dirty="0" err="1"/>
+              <a:t>dropna</a:t>
+            </a:r>
+            <a:r>
+              <a:rPr lang="en-US" sz="1400" dirty="0"/>
+              <a:t>(): Drops the missing values from a data frame and returns the rest</a:t>
+            </a:r>
+          </a:p>
+          <a:p>
+            <a:pPr marL="692658" lvl="1" indent="-400050">
+              <a:buFont typeface="+mj-lt"/>
+              <a:buAutoNum type="romanUcPeriod"/>
+            </a:pPr>
+            <a:r>
+              <a:rPr lang="en-US" sz="1400" dirty="0" err="1"/>
+              <a:t>fillna</a:t>
+            </a:r>
+            <a:r>
+              <a:rPr lang="en-US" sz="1400" dirty="0"/>
+              <a:t>(): Fills (or imputes) the missing values by a specified value</a:t>
+            </a:r>
+            <a:endParaRPr lang="en-IN" sz="1400" dirty="0"/>
+          </a:p>
+          <a:p>
+            <a:pPr marL="0" indent="0">
+              <a:buNone/>
+            </a:pPr>
+            <a:r>
+              <a:rPr lang="en-US" sz="1400" dirty="0"/>
+              <a:t>   Treating Missing Values</a:t>
+            </a:r>
+            <a:endParaRPr lang="en-US" sz="1200" dirty="0"/>
+          </a:p>
+          <a:p>
+            <a:r>
+              <a:rPr lang="en-US" sz="1400" dirty="0"/>
+              <a:t> Delete: Delete the missing values</a:t>
+            </a:r>
+          </a:p>
+          <a:p>
+            <a:r>
+              <a:rPr lang="en-US" sz="1400" dirty="0"/>
+              <a:t> Impute:</a:t>
+            </a:r>
+          </a:p>
+          <a:p>
+            <a:pPr lvl="2"/>
+            <a:r>
+              <a:rPr lang="en-US" sz="1000" dirty="0"/>
+              <a:t>Imputing by a simple statistic: Replace the missing values by another value, commonly the mean, median, mode etc.</a:t>
+            </a:r>
+          </a:p>
+          <a:p>
+            <a:pPr lvl="2"/>
+            <a:r>
+              <a:rPr lang="en-US" sz="1000" dirty="0"/>
+              <a:t>Predictive techniques: Use statistical models such as k-NN, SVM etc. to predict and impute missing values</a:t>
+            </a:r>
+            <a:endParaRPr lang="en-IN" sz="1000" dirty="0"/>
+          </a:p>
+        </p:txBody>
+      </p:sp>
+      <p:pic>
+        <p:nvPicPr>
+          <p:cNvPr id="4" name="Picture 3">
+            <a:extLst>
+              <a:ext uri="{FF2B5EF4-FFF2-40B4-BE49-F238E27FC236}">
+                <a16:creationId xmlns:a16="http://schemas.microsoft.com/office/drawing/2014/main" id="{3EF0EC5E-FBF5-7E6C-FDC6-594F83CFF276}"/>
+              </a:ext>
+            </a:extLst>
+          </p:cNvPr>
+          <p:cNvPicPr>
+            <a:picLocks noChangeAspect="1"/>
+          </p:cNvPicPr>
+          <p:nvPr/>
+        </p:nvPicPr>
+        <p:blipFill>
+          <a:blip r:embed="rId2"/>
+          <a:stretch>
+            <a:fillRect/>
+          </a:stretch>
+        </p:blipFill>
+        <p:spPr>
+          <a:xfrm>
+            <a:off x="-65885" y="-64169"/>
+            <a:ext cx="2857500" cy="762000"/>
+          </a:xfrm>
+          <a:prstGeom prst="rect">
+            <a:avLst/>
+          </a:prstGeom>
+        </p:spPr>
+      </p:pic>
+      <p:pic>
+        <p:nvPicPr>
+          <p:cNvPr id="5" name="Picture 4">
+            <a:extLst>
+              <a:ext uri="{FF2B5EF4-FFF2-40B4-BE49-F238E27FC236}">
+                <a16:creationId xmlns:a16="http://schemas.microsoft.com/office/drawing/2014/main" id="{20FA44F5-0486-A9E2-0F61-FE2D0A023490}"/>
+              </a:ext>
+            </a:extLst>
+          </p:cNvPr>
+          <p:cNvPicPr>
+            <a:picLocks noChangeAspect="1"/>
+          </p:cNvPicPr>
+          <p:nvPr/>
+        </p:nvPicPr>
+        <p:blipFill>
+          <a:blip r:embed="rId3"/>
+          <a:stretch>
+            <a:fillRect/>
+          </a:stretch>
+        </p:blipFill>
+        <p:spPr>
+          <a:xfrm>
+            <a:off x="10274967" y="18187"/>
+            <a:ext cx="1917032" cy="581804"/>
+          </a:xfrm>
+          <a:prstGeom prst="rect">
+            <a:avLst/>
+          </a:prstGeom>
+        </p:spPr>
+      </p:pic>
+      <p:pic>
+        <p:nvPicPr>
+          <p:cNvPr id="2050" name="Picture 2" descr="Imputing Missing values. Missing values in a dataset impact the… | by ...">
+            <a:extLst>
+              <a:ext uri="{FF2B5EF4-FFF2-40B4-BE49-F238E27FC236}">
+                <a16:creationId xmlns:a16="http://schemas.microsoft.com/office/drawing/2014/main" id="{A0D1550B-6907-E50F-1FC2-2E3121EA091A}"/>
+              </a:ext>
+            </a:extLst>
+          </p:cNvPr>
+          <p:cNvPicPr>
+            <a:picLocks noChangeAspect="1" noChangeArrowheads="1"/>
+          </p:cNvPicPr>
+          <p:nvPr/>
+        </p:nvPicPr>
+        <p:blipFill>
+          <a:blip r:embed="rId4">
+            <a:extLst>
+              <a:ext uri="{28A0092B-C50C-407E-A947-70E740481C1C}">
+                <a14:useLocalDpi xmlns:a14="http://schemas.microsoft.com/office/drawing/2010/main" val="0"/>
+              </a:ext>
+            </a:extLst>
+          </a:blip>
+          <a:srcRect/>
+          <a:stretch>
+            <a:fillRect/>
+          </a:stretch>
+        </p:blipFill>
+        <p:spPr bwMode="auto">
+          <a:xfrm>
+            <a:off x="8298180" y="3846095"/>
+            <a:ext cx="2857500" cy="2133600"/>
+          </a:xfrm>
+          <a:prstGeom prst="rect">
+            <a:avLst/>
+          </a:prstGeom>
+          <a:noFill/>
+          <a:extLst>
+            <a:ext uri="{909E8E84-426E-40DD-AFC4-6F175D3DCCD1}">
+              <a14:hiddenFill xmlns:a14="http://schemas.microsoft.com/office/drawing/2010/main">
+                <a:solidFill>
+                  <a:srgbClr val="FFFFFF"/>
+                </a:solidFill>
+              </a14:hiddenFill>
+            </a:ext>
+          </a:extLst>
+        </p:spPr>
+      </p:pic>
+    </p:spTree>
+    <p:extLst>
+      <p:ext uri="{BB962C8B-B14F-4D97-AF65-F5344CB8AC3E}">
+        <p14:creationId xmlns:p14="http://schemas.microsoft.com/office/powerpoint/2010/main" val="3616779762"/>
+      </p:ext>
+    </p:extLst>
+  </p:cSld>
+  <p:clrMapOvr>
+    <a:masterClrMapping/>
+  </p:clrMapOvr>
+</p:sld>
+</file>
+
+<file path=ppt/slides/slide7.xml><?xml version="1.0" encoding="utf-8"?>
+<p:sld xmlns:a="http://schemas.openxmlformats.org/drawingml/2006/main" xmlns:r="http://schemas.openxmlformats.org/officeDocument/2006/relationships" xmlns:p="http://schemas.openxmlformats.org/presentationml/2006/main">
+  <p:cSld>
+    <p:spTree>
+      <p:nvGrpSpPr>
+        <p:cNvPr id="1" name=""/>
+        <p:cNvGrpSpPr/>
+        <p:nvPr/>
+      </p:nvGrpSpPr>
+      <p:grpSpPr>
+        <a:xfrm>
+          <a:off x="0" y="0"/>
+          <a:ext cx="0" cy="0"/>
+          <a:chOff x="0" y="0"/>
+          <a:chExt cx="0" cy="0"/>
+        </a:xfrm>
+      </p:grpSpPr>
+      <p:sp>
+        <p:nvSpPr>
+          <p:cNvPr id="2" name="Title 1">
+            <a:extLst>
+              <a:ext uri="{FF2B5EF4-FFF2-40B4-BE49-F238E27FC236}">
+                <a16:creationId xmlns:a16="http://schemas.microsoft.com/office/drawing/2014/main" id="{F4AD4361-B14F-C4E6-2C78-947E5FA499C5}"/>
+              </a:ext>
+            </a:extLst>
+          </p:cNvPr>
+          <p:cNvSpPr>
+            <a:spLocks noGrp="1"/>
+          </p:cNvSpPr>
+          <p:nvPr>
+            <p:ph type="title"/>
+          </p:nvPr>
+        </p:nvSpPr>
+        <p:spPr/>
+        <p:txBody>
+          <a:bodyPr>
+            <a:normAutofit/>
+          </a:bodyPr>
+          <a:lstStyle/>
+          <a:p>
+            <a:r>
+              <a:rPr lang="en-IN" sz="4000" dirty="0"/>
               <a:t>Univariate/Segmented Analysis</a:t>
             </a:r>
           </a:p>
@@ -15559,7 +16454,79 @@
           <a:bodyPr/>
           <a:lstStyle/>
           <a:p>
-            <a:endParaRPr lang="en-IN" dirty="0"/>
+            <a:r>
+              <a:rPr lang="en-US" b="1" i="0" dirty="0">
+                <a:solidFill>
+                  <a:srgbClr val="202122"/>
+                </a:solidFill>
+                <a:effectLst/>
+                <a:latin typeface="Arial" panose="020B0604020202020204" pitchFamily="34" charset="0"/>
+              </a:rPr>
+              <a:t>Univariate</a:t>
+            </a:r>
+            <a:r>
+              <a:rPr lang="en-US" b="0" i="0" dirty="0">
+                <a:solidFill>
+                  <a:srgbClr val="202122"/>
+                </a:solidFill>
+                <a:effectLst/>
+                <a:latin typeface="Arial" panose="020B0604020202020204" pitchFamily="34" charset="0"/>
+              </a:rPr>
+              <a:t> is a term commonly used in statistics to describe a type of data which consists of observations on only a single characteristic or attribute</a:t>
+            </a:r>
+          </a:p>
+          <a:p>
+            <a:pPr algn="l"/>
+            <a:r>
+              <a:rPr lang="en-US" sz="1400" b="1" i="0" dirty="0">
+                <a:solidFill>
+                  <a:srgbClr val="000000"/>
+                </a:solidFill>
+                <a:effectLst/>
+                <a:latin typeface="Arial" panose="020B0604020202020204" pitchFamily="34" charset="0"/>
+              </a:rPr>
+              <a:t>Categorical univariate data</a:t>
+            </a:r>
+          </a:p>
+          <a:p>
+            <a:pPr lvl="1"/>
+            <a:r>
+              <a:rPr lang="en-US" sz="1400" b="0" i="0" dirty="0">
+                <a:solidFill>
+                  <a:srgbClr val="202122"/>
+                </a:solidFill>
+                <a:effectLst/>
+                <a:latin typeface="Arial" panose="020B0604020202020204" pitchFamily="34" charset="0"/>
+              </a:rPr>
+              <a:t>Categorical univariate data consists of non-numerical observations that may be placed in categories. </a:t>
+            </a:r>
+          </a:p>
+          <a:p>
+            <a:pPr algn="l"/>
+            <a:r>
+              <a:rPr lang="en-US" sz="1400" b="1" i="0" dirty="0">
+                <a:solidFill>
+                  <a:srgbClr val="000000"/>
+                </a:solidFill>
+                <a:effectLst/>
+                <a:latin typeface="Arial" panose="020B0604020202020204" pitchFamily="34" charset="0"/>
+              </a:rPr>
+              <a:t>Numerical univariate data</a:t>
+            </a:r>
+          </a:p>
+          <a:p>
+            <a:pPr lvl="1"/>
+            <a:r>
+              <a:rPr lang="en-US" sz="1400" b="0" i="0" dirty="0">
+                <a:solidFill>
+                  <a:srgbClr val="202122"/>
+                </a:solidFill>
+                <a:effectLst/>
+                <a:latin typeface="Arial" panose="020B0604020202020204" pitchFamily="34" charset="0"/>
+              </a:rPr>
+              <a:t>Numerical univariate data consists of observations that are numbers. </a:t>
+            </a:r>
+            <a:endParaRPr lang="en-IN" sz="1400" dirty="0"/>
           </a:p>
         </p:txBody>
       </p:sp>
@@ -15626,7 +16593,7 @@
     </p:spTree>
     <p:extLst>
       <p:ext uri="{BB962C8B-B14F-4D97-AF65-F5344CB8AC3E}">
-        <p14:creationId xmlns:p14="http://schemas.microsoft.com/office/powerpoint/2010/main" val="505863472"/>
+        <p14:creationId xmlns:p14="http://schemas.microsoft.com/office/powerpoint/2010/main" val="2332977043"/>
       </p:ext>
     </p:extLst>
   </p:cSld>
@@ -15636,7 +16603,7 @@
 </p:sld>
 </file>
 
-<file path=ppt/slides/slide6.xml><?xml version="1.0" encoding="utf-8"?>
+<file path=ppt/slides/slide8.xml><?xml version="1.0" encoding="utf-8"?>
 <p:sld xmlns:a="http://schemas.openxmlformats.org/drawingml/2006/main" xmlns:r="http://schemas.openxmlformats.org/officeDocument/2006/relationships" xmlns:p="http://schemas.openxmlformats.org/presentationml/2006/main">
   <p:cSld>
     <p:spTree>
@@ -15781,7 +16748,7 @@
 </p:sld>
 </file>
 
-<file path=ppt/slides/slide7.xml><?xml version="1.0" encoding="utf-8"?>
+<file path=ppt/slides/slide9.xml><?xml version="1.0" encoding="utf-8"?>
 <p:sld xmlns:a="http://schemas.openxmlformats.org/drawingml/2006/main" xmlns:r="http://schemas.openxmlformats.org/officeDocument/2006/relationships" xmlns:p="http://schemas.openxmlformats.org/presentationml/2006/main">
   <p:cSld>
     <p:spTree>
@@ -15917,296 +16884,6 @@
     <p:extLst>
       <p:ext uri="{BB962C8B-B14F-4D97-AF65-F5344CB8AC3E}">
         <p14:creationId xmlns:p14="http://schemas.microsoft.com/office/powerpoint/2010/main" val="1377014046"/>
-      </p:ext>
-    </p:extLst>
-  </p:cSld>
-  <p:clrMapOvr>
-    <a:masterClrMapping/>
-  </p:clrMapOvr>
-</p:sld>
-</file>
-
-<file path=ppt/slides/slide8.xml><?xml version="1.0" encoding="utf-8"?>
-<p:sld xmlns:a="http://schemas.openxmlformats.org/drawingml/2006/main" xmlns:r="http://schemas.openxmlformats.org/officeDocument/2006/relationships" xmlns:p="http://schemas.openxmlformats.org/presentationml/2006/main">
-  <p:cSld>
-    <p:spTree>
-      <p:nvGrpSpPr>
-        <p:cNvPr id="1" name=""/>
-        <p:cNvGrpSpPr/>
-        <p:nvPr/>
-      </p:nvGrpSpPr>
-      <p:grpSpPr>
-        <a:xfrm>
-          <a:off x="0" y="0"/>
-          <a:ext cx="0" cy="0"/>
-          <a:chOff x="0" y="0"/>
-          <a:chExt cx="0" cy="0"/>
-        </a:xfrm>
-      </p:grpSpPr>
-      <p:sp>
-        <p:nvSpPr>
-          <p:cNvPr id="2" name="Title 1">
-            <a:extLst>
-              <a:ext uri="{FF2B5EF4-FFF2-40B4-BE49-F238E27FC236}">
-                <a16:creationId xmlns:a16="http://schemas.microsoft.com/office/drawing/2014/main" id="{F4AD4361-B14F-C4E6-2C78-947E5FA499C5}"/>
-              </a:ext>
-            </a:extLst>
-          </p:cNvPr>
-          <p:cNvSpPr>
-            <a:spLocks noGrp="1"/>
-          </p:cNvSpPr>
-          <p:nvPr>
-            <p:ph type="title"/>
-          </p:nvPr>
-        </p:nvSpPr>
-        <p:spPr/>
-        <p:txBody>
-          <a:bodyPr>
-            <a:normAutofit/>
-          </a:bodyPr>
-          <a:lstStyle/>
-          <a:p>
-            <a:r>
-              <a:rPr lang="en-IN" sz="4000" dirty="0"/>
-              <a:t>Univariate/Segmented Analysis</a:t>
-            </a:r>
-          </a:p>
-        </p:txBody>
-      </p:sp>
-      <p:sp>
-        <p:nvSpPr>
-          <p:cNvPr id="3" name="Content Placeholder 2">
-            <a:extLst>
-              <a:ext uri="{FF2B5EF4-FFF2-40B4-BE49-F238E27FC236}">
-                <a16:creationId xmlns:a16="http://schemas.microsoft.com/office/drawing/2014/main" id="{223BCCFF-517C-F2CD-8998-4258D7310EC5}"/>
-              </a:ext>
-            </a:extLst>
-          </p:cNvPr>
-          <p:cNvSpPr>
-            <a:spLocks noGrp="1"/>
-          </p:cNvSpPr>
-          <p:nvPr>
-            <p:ph idx="1"/>
-          </p:nvPr>
-        </p:nvSpPr>
-        <p:spPr/>
-        <p:txBody>
-          <a:bodyPr/>
-          <a:lstStyle/>
-          <a:p>
-            <a:endParaRPr lang="en-IN" dirty="0"/>
-          </a:p>
-        </p:txBody>
-      </p:sp>
-      <p:pic>
-        <p:nvPicPr>
-          <p:cNvPr id="4" name="Picture 3">
-            <a:extLst>
-              <a:ext uri="{FF2B5EF4-FFF2-40B4-BE49-F238E27FC236}">
-                <a16:creationId xmlns:a16="http://schemas.microsoft.com/office/drawing/2014/main" id="{3EF0EC5E-FBF5-7E6C-FDC6-594F83CFF276}"/>
-              </a:ext>
-            </a:extLst>
-          </p:cNvPr>
-          <p:cNvPicPr>
-            <a:picLocks noChangeAspect="1"/>
-          </p:cNvPicPr>
-          <p:nvPr/>
-        </p:nvPicPr>
-        <p:blipFill>
-          <a:blip r:embed="rId2"/>
-          <a:stretch>
-            <a:fillRect/>
-          </a:stretch>
-        </p:blipFill>
-        <p:spPr>
-          <a:xfrm>
-            <a:off x="-65885" y="-64169"/>
-            <a:ext cx="2857500" cy="762000"/>
-          </a:xfrm>
-          <a:prstGeom prst="rect">
-            <a:avLst/>
-          </a:prstGeom>
-        </p:spPr>
-      </p:pic>
-      <p:pic>
-        <p:nvPicPr>
-          <p:cNvPr id="5" name="Picture 4">
-            <a:extLst>
-              <a:ext uri="{FF2B5EF4-FFF2-40B4-BE49-F238E27FC236}">
-                <a16:creationId xmlns:a16="http://schemas.microsoft.com/office/drawing/2014/main" id="{20FA44F5-0486-A9E2-0F61-FE2D0A023490}"/>
-              </a:ext>
-            </a:extLst>
-          </p:cNvPr>
-          <p:cNvPicPr>
-            <a:picLocks noChangeAspect="1"/>
-          </p:cNvPicPr>
-          <p:nvPr/>
-        </p:nvPicPr>
-        <p:blipFill>
-          <a:blip r:embed="rId3"/>
-          <a:stretch>
-            <a:fillRect/>
-          </a:stretch>
-        </p:blipFill>
-        <p:spPr>
-          <a:xfrm>
-            <a:off x="10274967" y="18187"/>
-            <a:ext cx="1917032" cy="581804"/>
-          </a:xfrm>
-          <a:prstGeom prst="rect">
-            <a:avLst/>
-          </a:prstGeom>
-        </p:spPr>
-      </p:pic>
-    </p:spTree>
-    <p:extLst>
-      <p:ext uri="{BB962C8B-B14F-4D97-AF65-F5344CB8AC3E}">
-        <p14:creationId xmlns:p14="http://schemas.microsoft.com/office/powerpoint/2010/main" val="2974645228"/>
-      </p:ext>
-    </p:extLst>
-  </p:cSld>
-  <p:clrMapOvr>
-    <a:masterClrMapping/>
-  </p:clrMapOvr>
-</p:sld>
-</file>
-
-<file path=ppt/slides/slide9.xml><?xml version="1.0" encoding="utf-8"?>
-<p:sld xmlns:a="http://schemas.openxmlformats.org/drawingml/2006/main" xmlns:r="http://schemas.openxmlformats.org/officeDocument/2006/relationships" xmlns:p="http://schemas.openxmlformats.org/presentationml/2006/main">
-  <p:cSld>
-    <p:spTree>
-      <p:nvGrpSpPr>
-        <p:cNvPr id="1" name=""/>
-        <p:cNvGrpSpPr/>
-        <p:nvPr/>
-      </p:nvGrpSpPr>
-      <p:grpSpPr>
-        <a:xfrm>
-          <a:off x="0" y="0"/>
-          <a:ext cx="0" cy="0"/>
-          <a:chOff x="0" y="0"/>
-          <a:chExt cx="0" cy="0"/>
-        </a:xfrm>
-      </p:grpSpPr>
-      <p:sp>
-        <p:nvSpPr>
-          <p:cNvPr id="2" name="Title 1">
-            <a:extLst>
-              <a:ext uri="{FF2B5EF4-FFF2-40B4-BE49-F238E27FC236}">
-                <a16:creationId xmlns:a16="http://schemas.microsoft.com/office/drawing/2014/main" id="{F4AD4361-B14F-C4E6-2C78-947E5FA499C5}"/>
-              </a:ext>
-            </a:extLst>
-          </p:cNvPr>
-          <p:cNvSpPr>
-            <a:spLocks noGrp="1"/>
-          </p:cNvSpPr>
-          <p:nvPr>
-            <p:ph type="title"/>
-          </p:nvPr>
-        </p:nvSpPr>
-        <p:spPr/>
-        <p:txBody>
-          <a:bodyPr>
-            <a:normAutofit/>
-          </a:bodyPr>
-          <a:lstStyle/>
-          <a:p>
-            <a:r>
-              <a:rPr lang="en-IN" sz="4000" dirty="0"/>
-              <a:t>Bivariate/Multivariate Analysis</a:t>
-            </a:r>
-          </a:p>
-        </p:txBody>
-      </p:sp>
-      <p:sp>
-        <p:nvSpPr>
-          <p:cNvPr id="3" name="Content Placeholder 2">
-            <a:extLst>
-              <a:ext uri="{FF2B5EF4-FFF2-40B4-BE49-F238E27FC236}">
-                <a16:creationId xmlns:a16="http://schemas.microsoft.com/office/drawing/2014/main" id="{223BCCFF-517C-F2CD-8998-4258D7310EC5}"/>
-              </a:ext>
-            </a:extLst>
-          </p:cNvPr>
-          <p:cNvSpPr>
-            <a:spLocks noGrp="1"/>
-          </p:cNvSpPr>
-          <p:nvPr>
-            <p:ph idx="1"/>
-          </p:nvPr>
-        </p:nvSpPr>
-        <p:spPr/>
-        <p:txBody>
-          <a:bodyPr/>
-          <a:lstStyle/>
-          <a:p>
-            <a:endParaRPr lang="en-IN" dirty="0"/>
-          </a:p>
-        </p:txBody>
-      </p:sp>
-      <p:pic>
-        <p:nvPicPr>
-          <p:cNvPr id="4" name="Picture 3">
-            <a:extLst>
-              <a:ext uri="{FF2B5EF4-FFF2-40B4-BE49-F238E27FC236}">
-                <a16:creationId xmlns:a16="http://schemas.microsoft.com/office/drawing/2014/main" id="{3EF0EC5E-FBF5-7E6C-FDC6-594F83CFF276}"/>
-              </a:ext>
-            </a:extLst>
-          </p:cNvPr>
-          <p:cNvPicPr>
-            <a:picLocks noChangeAspect="1"/>
-          </p:cNvPicPr>
-          <p:nvPr/>
-        </p:nvPicPr>
-        <p:blipFill>
-          <a:blip r:embed="rId2"/>
-          <a:stretch>
-            <a:fillRect/>
-          </a:stretch>
-        </p:blipFill>
-        <p:spPr>
-          <a:xfrm>
-            <a:off x="-65885" y="-64169"/>
-            <a:ext cx="2857500" cy="762000"/>
-          </a:xfrm>
-          <a:prstGeom prst="rect">
-            <a:avLst/>
-          </a:prstGeom>
-        </p:spPr>
-      </p:pic>
-      <p:pic>
-        <p:nvPicPr>
-          <p:cNvPr id="5" name="Picture 4">
-            <a:extLst>
-              <a:ext uri="{FF2B5EF4-FFF2-40B4-BE49-F238E27FC236}">
-                <a16:creationId xmlns:a16="http://schemas.microsoft.com/office/drawing/2014/main" id="{20FA44F5-0486-A9E2-0F61-FE2D0A023490}"/>
-              </a:ext>
-            </a:extLst>
-          </p:cNvPr>
-          <p:cNvPicPr>
-            <a:picLocks noChangeAspect="1"/>
-          </p:cNvPicPr>
-          <p:nvPr/>
-        </p:nvPicPr>
-        <p:blipFill>
-          <a:blip r:embed="rId3"/>
-          <a:stretch>
-            <a:fillRect/>
-          </a:stretch>
-        </p:blipFill>
-        <p:spPr>
-          <a:xfrm>
-            <a:off x="10274967" y="18187"/>
-            <a:ext cx="1917032" cy="581804"/>
-          </a:xfrm>
-          <a:prstGeom prst="rect">
-            <a:avLst/>
-          </a:prstGeom>
-        </p:spPr>
-      </p:pic>
-    </p:spTree>
-    <p:extLst>
-      <p:ext uri="{BB962C8B-B14F-4D97-AF65-F5344CB8AC3E}">
-        <p14:creationId xmlns:p14="http://schemas.microsoft.com/office/powerpoint/2010/main" val="1480929448"/>
       </p:ext>
     </p:extLst>
   </p:cSld>
@@ -16543,21 +17220,21 @@
 </file>
 
 <file path=customXml/item1.xml><?xml version="1.0" encoding="utf-8"?>
+<?mso-contentType ?>
+<FormTemplates xmlns="http://schemas.microsoft.com/sharepoint/v3/contenttype/forms">
+  <Display>DocumentLibraryForm</Display>
+  <Edit>DocumentLibraryForm</Edit>
+  <New>DocumentLibraryForm</New>
+</FormTemplates>
+</file>
+
+<file path=customXml/item2.xml><?xml version="1.0" encoding="utf-8"?>
 <p:properties xmlns:p="http://schemas.microsoft.com/office/2006/metadata/properties" xmlns:xsi="http://www.w3.org/2001/XMLSchema-instance" xmlns:pc="http://schemas.microsoft.com/office/infopath/2007/PartnerControls">
   <documentManagement>
     <Status xmlns="71af3243-3dd4-4a8d-8c0d-dd76da1f02a5">Not started</Status>
     <MediaServiceKeyPoints xmlns="71af3243-3dd4-4a8d-8c0d-dd76da1f02a5" xsi:nil="true"/>
   </documentManagement>
 </p:properties>
-</file>
-
-<file path=customXml/item2.xml><?xml version="1.0" encoding="utf-8"?>
-<?mso-contentType ?>
-<FormTemplates xmlns="http://schemas.microsoft.com/sharepoint/v3/contenttype/forms">
-  <Display>DocumentLibraryForm</Display>
-  <Edit>DocumentLibraryForm</Edit>
-  <New>DocumentLibraryForm</New>
-</FormTemplates>
 </file>
 
 <file path=customXml/item3.xml><?xml version="1.0" encoding="utf-8"?>
@@ -16782,19 +17459,19 @@
 </file>
 
 <file path=customXml/itemProps1.xml><?xml version="1.0" encoding="utf-8"?>
+<ds:datastoreItem xmlns:ds="http://schemas.openxmlformats.org/officeDocument/2006/customXml" ds:itemID="{AA3F7EDC-E5B4-4BBC-9D2A-CBE6D46C37AD}">
+  <ds:schemaRefs>
+    <ds:schemaRef ds:uri="http://schemas.microsoft.com/sharepoint/v3/contenttype/forms"/>
+  </ds:schemaRefs>
+</ds:datastoreItem>
+</file>
+
+<file path=customXml/itemProps2.xml><?xml version="1.0" encoding="utf-8"?>
 <ds:datastoreItem xmlns:ds="http://schemas.openxmlformats.org/officeDocument/2006/customXml" ds:itemID="{A03EEFF0-FB57-4CB4-8BFC-DF397689E2ED}">
   <ds:schemaRefs>
     <ds:schemaRef ds:uri="http://schemas.microsoft.com/office/2006/metadata/properties"/>
     <ds:schemaRef ds:uri="http://schemas.microsoft.com/office/infopath/2007/PartnerControls"/>
     <ds:schemaRef ds:uri="71af3243-3dd4-4a8d-8c0d-dd76da1f02a5"/>
-  </ds:schemaRefs>
-</ds:datastoreItem>
-</file>
-
-<file path=customXml/itemProps2.xml><?xml version="1.0" encoding="utf-8"?>
-<ds:datastoreItem xmlns:ds="http://schemas.openxmlformats.org/officeDocument/2006/customXml" ds:itemID="{AA3F7EDC-E5B4-4BBC-9D2A-CBE6D46C37AD}">
-  <ds:schemaRefs>
-    <ds:schemaRef ds:uri="http://schemas.microsoft.com/sharepoint/v3/contenttype/forms"/>
   </ds:schemaRefs>
 </ds:datastoreItem>
 </file>

</xml_diff>